<commit_message>
several font adjustments; one correction, changed Context to SubprogramContext
</commit_message>
<xml_diff>
--- a/PowerPoint Slides/13 - Subprograms.pptx
+++ b/PowerPoint Slides/13 - Subprograms.pptx
@@ -71,7 +71,7 @@
     <p:sldId id="310" r:id="rId59"/>
   </p:sldIdLst>
   <p:sldSz cx="9144000" cy="6858000" type="screen4x3"/>
-  <p:notesSz cx="7010400" cy="9296400"/>
+  <p:notesSz cx="7315200" cy="9601200"/>
   <p:defaultTextStyle>
     <a:defPPr>
       <a:defRPr lang="en-US"/>
@@ -214,12 +214,12 @@
     </p:ext>
     <p:ext uri="{2D200454-40CA-4A62-9FC3-DE9A4176ACB9}">
       <p15:notesGuideLst xmlns:p15="http://schemas.microsoft.com/office/powerpoint/2012/main">
-        <p15:guide id="1" orient="horz" pos="2928">
+        <p15:guide id="1" orient="horz" pos="3024" userDrawn="1">
           <p15:clr>
             <a:srgbClr val="A4A3A4"/>
           </p15:clr>
         </p15:guide>
-        <p15:guide id="2" pos="2208">
+        <p15:guide id="2" pos="2304" userDrawn="1">
           <p15:clr>
             <a:srgbClr val="A4A3A4"/>
           </p15:clr>
@@ -267,8 +267,8 @@
         </p:nvSpPr>
         <p:spPr bwMode="auto">
           <a:xfrm>
-            <a:off x="3971925" y="0"/>
-            <a:ext cx="3038475" cy="465138"/>
+            <a:off x="4144618" y="0"/>
+            <a:ext cx="3170583" cy="480388"/>
           </a:xfrm>
           <a:prstGeom prst="rect">
             <a:avLst/>
@@ -283,13 +283,13 @@
           <a:effectLst/>
         </p:spPr>
         <p:txBody>
-          <a:bodyPr vert="horz" wrap="square" lIns="93168" tIns="46584" rIns="93168" bIns="46584" numCol="1" anchor="t" anchorCtr="0" compatLnSpc="1">
+          <a:bodyPr vert="horz" wrap="square" lIns="96643" tIns="48322" rIns="96643" bIns="48322" numCol="1" anchor="t" anchorCtr="0" compatLnSpc="1">
             <a:prstTxWarp prst="textNoShape">
               <a:avLst/>
             </a:prstTxWarp>
           </a:bodyPr>
           <a:lstStyle>
-            <a:lvl1pPr algn="r" defTabSz="931670">
+            <a:lvl1pPr algn="r" defTabSz="966421">
               <a:defRPr sz="1200"/>
             </a:lvl1pPr>
           </a:lstStyle>
@@ -318,8 +318,8 @@
         </p:nvSpPr>
         <p:spPr bwMode="auto">
           <a:xfrm>
-            <a:off x="3971925" y="8831263"/>
-            <a:ext cx="3038475" cy="465137"/>
+            <a:off x="4144618" y="9120813"/>
+            <a:ext cx="3170583" cy="480387"/>
           </a:xfrm>
           <a:prstGeom prst="rect">
             <a:avLst/>
@@ -334,13 +334,13 @@
           <a:effectLst/>
         </p:spPr>
         <p:txBody>
-          <a:bodyPr vert="horz" wrap="square" lIns="93168" tIns="46584" rIns="93168" bIns="46584" numCol="1" anchor="b" anchorCtr="0" compatLnSpc="1">
+          <a:bodyPr vert="horz" wrap="square" lIns="96643" tIns="48322" rIns="96643" bIns="48322" numCol="1" anchor="b" anchorCtr="0" compatLnSpc="1">
             <a:prstTxWarp prst="textNoShape">
               <a:avLst/>
             </a:prstTxWarp>
           </a:bodyPr>
           <a:lstStyle>
-            <a:lvl1pPr algn="r" defTabSz="931670">
+            <a:lvl1pPr algn="r" defTabSz="966421">
               <a:defRPr sz="1200"/>
             </a:lvl1pPr>
           </a:lstStyle>
@@ -419,7 +419,7 @@
         <p:spPr bwMode="auto">
           <a:xfrm>
             <a:off x="0" y="0"/>
-            <a:ext cx="3038475" cy="465138"/>
+            <a:ext cx="3170583" cy="480388"/>
           </a:xfrm>
           <a:prstGeom prst="rect">
             <a:avLst/>
@@ -434,13 +434,13 @@
           <a:effectLst/>
         </p:spPr>
         <p:txBody>
-          <a:bodyPr vert="horz" wrap="square" lIns="93168" tIns="46584" rIns="93168" bIns="46584" numCol="1" anchor="t" anchorCtr="0" compatLnSpc="1">
+          <a:bodyPr vert="horz" wrap="square" lIns="96643" tIns="48322" rIns="96643" bIns="48322" numCol="1" anchor="t" anchorCtr="0" compatLnSpc="1">
             <a:prstTxWarp prst="textNoShape">
               <a:avLst/>
             </a:prstTxWarp>
           </a:bodyPr>
           <a:lstStyle>
-            <a:lvl1pPr algn="l" defTabSz="931670">
+            <a:lvl1pPr algn="l" defTabSz="966421">
               <a:defRPr sz="1200"/>
             </a:lvl1pPr>
           </a:lstStyle>
@@ -467,8 +467,8 @@
         </p:nvSpPr>
         <p:spPr bwMode="auto">
           <a:xfrm>
-            <a:off x="3971925" y="0"/>
-            <a:ext cx="3038475" cy="465138"/>
+            <a:off x="4144618" y="0"/>
+            <a:ext cx="3170583" cy="480388"/>
           </a:xfrm>
           <a:prstGeom prst="rect">
             <a:avLst/>
@@ -483,13 +483,13 @@
           <a:effectLst/>
         </p:spPr>
         <p:txBody>
-          <a:bodyPr vert="horz" wrap="square" lIns="93168" tIns="46584" rIns="93168" bIns="46584" numCol="1" anchor="t" anchorCtr="0" compatLnSpc="1">
+          <a:bodyPr vert="horz" wrap="square" lIns="96643" tIns="48322" rIns="96643" bIns="48322" numCol="1" anchor="t" anchorCtr="0" compatLnSpc="1">
             <a:prstTxWarp prst="textNoShape">
               <a:avLst/>
             </a:prstTxWarp>
           </a:bodyPr>
           <a:lstStyle>
-            <a:lvl1pPr algn="r" defTabSz="931670">
+            <a:lvl1pPr algn="r" defTabSz="966421">
               <a:defRPr sz="1200"/>
             </a:lvl1pPr>
           </a:lstStyle>
@@ -513,8 +513,8 @@
         </p:nvSpPr>
         <p:spPr bwMode="auto">
           <a:xfrm>
-            <a:off x="1181100" y="696913"/>
-            <a:ext cx="4648200" cy="3486150"/>
+            <a:off x="1257300" y="719138"/>
+            <a:ext cx="4800600" cy="3600450"/>
           </a:xfrm>
           <a:prstGeom prst="rect">
             <a:avLst/>
@@ -542,8 +542,8 @@
         </p:nvSpPr>
         <p:spPr bwMode="auto">
           <a:xfrm>
-            <a:off x="935038" y="4416425"/>
-            <a:ext cx="5140325" cy="4183063"/>
+            <a:off x="975693" y="4561226"/>
+            <a:ext cx="5363817" cy="4320213"/>
           </a:xfrm>
           <a:prstGeom prst="rect">
             <a:avLst/>
@@ -558,7 +558,7 @@
           <a:effectLst/>
         </p:spPr>
         <p:txBody>
-          <a:bodyPr vert="horz" wrap="square" lIns="93168" tIns="46584" rIns="93168" bIns="46584" numCol="1" anchor="t" anchorCtr="0" compatLnSpc="1">
+          <a:bodyPr vert="horz" wrap="square" lIns="96643" tIns="48322" rIns="96643" bIns="48322" numCol="1" anchor="t" anchorCtr="0" compatLnSpc="1">
             <a:prstTxWarp prst="textNoShape">
               <a:avLst/>
             </a:prstTxWarp>
@@ -613,8 +613,8 @@
         </p:nvSpPr>
         <p:spPr bwMode="auto">
           <a:xfrm>
-            <a:off x="0" y="8831263"/>
-            <a:ext cx="3038475" cy="465137"/>
+            <a:off x="0" y="9120813"/>
+            <a:ext cx="3170583" cy="480387"/>
           </a:xfrm>
           <a:prstGeom prst="rect">
             <a:avLst/>
@@ -629,13 +629,13 @@
           <a:effectLst/>
         </p:spPr>
         <p:txBody>
-          <a:bodyPr vert="horz" wrap="square" lIns="93168" tIns="46584" rIns="93168" bIns="46584" numCol="1" anchor="b" anchorCtr="0" compatLnSpc="1">
+          <a:bodyPr vert="horz" wrap="square" lIns="96643" tIns="48322" rIns="96643" bIns="48322" numCol="1" anchor="b" anchorCtr="0" compatLnSpc="1">
             <a:prstTxWarp prst="textNoShape">
               <a:avLst/>
             </a:prstTxWarp>
           </a:bodyPr>
           <a:lstStyle>
-            <a:lvl1pPr algn="l" defTabSz="931670">
+            <a:lvl1pPr algn="l" defTabSz="966421">
               <a:defRPr sz="1200"/>
             </a:lvl1pPr>
           </a:lstStyle>
@@ -659,8 +659,8 @@
         </p:nvSpPr>
         <p:spPr bwMode="auto">
           <a:xfrm>
-            <a:off x="3971925" y="8831263"/>
-            <a:ext cx="3038475" cy="465137"/>
+            <a:off x="4144618" y="9120813"/>
+            <a:ext cx="3170583" cy="480387"/>
           </a:xfrm>
           <a:prstGeom prst="rect">
             <a:avLst/>
@@ -675,13 +675,13 @@
           <a:effectLst/>
         </p:spPr>
         <p:txBody>
-          <a:bodyPr vert="horz" wrap="square" lIns="93168" tIns="46584" rIns="93168" bIns="46584" numCol="1" anchor="b" anchorCtr="0" compatLnSpc="1">
+          <a:bodyPr vert="horz" wrap="square" lIns="96643" tIns="48322" rIns="96643" bIns="48322" numCol="1" anchor="b" anchorCtr="0" compatLnSpc="1">
             <a:prstTxWarp prst="textNoShape">
               <a:avLst/>
             </a:prstTxWarp>
           </a:bodyPr>
           <a:lstStyle>
-            <a:lvl1pPr algn="r" defTabSz="931670">
+            <a:lvl1pPr algn="r" defTabSz="966421">
               <a:defRPr sz="1200"/>
             </a:lvl1pPr>
           </a:lstStyle>
@@ -868,7 +868,7 @@
           <a:bodyPr/>
           <a:lstStyle/>
           <a:p>
-            <a:pPr defTabSz="930275"/>
+            <a:pPr defTabSz="964974"/>
             <a:r>
               <a:rPr lang="en-US"/>
               <a:t>Subprograms</a:t>
@@ -893,10 +893,10 @@
           <a:bodyPr/>
           <a:lstStyle/>
           <a:p>
-            <a:pPr defTabSz="930275"/>
+            <a:pPr defTabSz="964974"/>
             <a:fld id="{92CAFDEE-A529-4113-A992-ABDE1DFB9186}" type="slidenum">
               <a:rPr lang="en-US" smtClean="0"/>
-              <a:pPr defTabSz="930275"/>
+              <a:pPr defTabSz="964974"/>
               <a:t>1</a:t>
             </a:fld>
             <a:endParaRPr lang="en-US"/>
@@ -1023,7 +1023,7 @@
           <a:bodyPr/>
           <a:lstStyle/>
           <a:p>
-            <a:pPr defTabSz="930275"/>
+            <a:pPr defTabSz="964974"/>
             <a:r>
               <a:rPr lang="en-US"/>
               <a:t>Subprograms</a:t>
@@ -1048,10 +1048,10 @@
           <a:bodyPr/>
           <a:lstStyle/>
           <a:p>
-            <a:pPr defTabSz="930275"/>
+            <a:pPr defTabSz="964974"/>
             <a:fld id="{EB7972A9-078D-4C96-9A05-F5C8A4AEC107}" type="slidenum">
               <a:rPr lang="en-US" smtClean="0"/>
-              <a:pPr defTabSz="930275"/>
+              <a:pPr defTabSz="964974"/>
               <a:t>12</a:t>
             </a:fld>
             <a:endParaRPr lang="en-US"/>
@@ -1375,7 +1375,7 @@
           <a:bodyPr/>
           <a:lstStyle/>
           <a:p>
-            <a:pPr defTabSz="931774"/>
+            <a:pPr defTabSz="966529"/>
             <a:r>
               <a:rPr lang="en-US" dirty="0"/>
               <a:t>Constraint Analysis</a:t>
@@ -1400,10 +1400,10 @@
           <a:bodyPr/>
           <a:lstStyle/>
           <a:p>
-            <a:pPr defTabSz="931774"/>
+            <a:pPr defTabSz="966529"/>
             <a:fld id="{14BBFF45-95E4-44E8-9F2E-8B751949D653}" type="slidenum">
               <a:rPr lang="en-US" smtClean="0"/>
-              <a:pPr defTabSz="931774"/>
+              <a:pPr defTabSz="966529"/>
               <a:t>15</a:t>
             </a:fld>
             <a:endParaRPr lang="en-US" dirty="0"/>
@@ -1610,7 +1610,7 @@
           <a:bodyPr/>
           <a:lstStyle/>
           <a:p>
-            <a:pPr defTabSz="930275"/>
+            <a:pPr defTabSz="964974"/>
             <a:r>
               <a:rPr lang="en-US"/>
               <a:t>Subprograms</a:t>
@@ -1635,10 +1635,10 @@
           <a:bodyPr/>
           <a:lstStyle/>
           <a:p>
-            <a:pPr defTabSz="930275"/>
+            <a:pPr defTabSz="964974"/>
             <a:fld id="{E3C060E8-07A0-4097-86CE-B741702B405C}" type="slidenum">
               <a:rPr lang="en-US" smtClean="0"/>
-              <a:pPr defTabSz="930275"/>
+              <a:pPr defTabSz="964974"/>
               <a:t>17</a:t>
             </a:fld>
             <a:endParaRPr lang="en-US"/>
@@ -1728,7 +1728,7 @@
           <a:bodyPr/>
           <a:lstStyle/>
           <a:p>
-            <a:pPr defTabSz="930275"/>
+            <a:pPr defTabSz="964974"/>
             <a:r>
               <a:rPr lang="en-US"/>
               <a:t>Subprograms</a:t>
@@ -1753,10 +1753,10 @@
           <a:bodyPr/>
           <a:lstStyle/>
           <a:p>
-            <a:pPr defTabSz="930275"/>
+            <a:pPr defTabSz="964974"/>
             <a:fld id="{E3C060E8-07A0-4097-86CE-B741702B405C}" type="slidenum">
               <a:rPr lang="en-US" smtClean="0"/>
-              <a:pPr defTabSz="930275"/>
+              <a:pPr defTabSz="964974"/>
               <a:t>18</a:t>
             </a:fld>
             <a:endParaRPr lang="en-US"/>
@@ -1846,7 +1846,7 @@
           <a:bodyPr/>
           <a:lstStyle/>
           <a:p>
-            <a:pPr defTabSz="930275"/>
+            <a:pPr defTabSz="964974"/>
             <a:r>
               <a:rPr lang="en-US"/>
               <a:t>Subprograms</a:t>
@@ -1871,10 +1871,10 @@
           <a:bodyPr/>
           <a:lstStyle/>
           <a:p>
-            <a:pPr defTabSz="930275"/>
+            <a:pPr defTabSz="964974"/>
             <a:fld id="{CFD82E65-4A99-464B-9822-320074BC2484}" type="slidenum">
               <a:rPr lang="en-US" smtClean="0"/>
-              <a:pPr defTabSz="930275"/>
+              <a:pPr defTabSz="964974"/>
               <a:t>19</a:t>
             </a:fld>
             <a:endParaRPr lang="en-US"/>
@@ -1964,7 +1964,7 @@
           <a:bodyPr/>
           <a:lstStyle/>
           <a:p>
-            <a:pPr defTabSz="930275"/>
+            <a:pPr defTabSz="964974"/>
             <a:r>
               <a:rPr lang="en-US"/>
               <a:t>Subprograms</a:t>
@@ -1989,10 +1989,10 @@
           <a:bodyPr/>
           <a:lstStyle/>
           <a:p>
-            <a:pPr defTabSz="930275"/>
+            <a:pPr defTabSz="964974"/>
             <a:fld id="{275314F5-DC0F-409F-8DD6-E8BBC59DC18E}" type="slidenum">
               <a:rPr lang="en-US" smtClean="0"/>
-              <a:pPr defTabSz="930275"/>
+              <a:pPr defTabSz="964974"/>
               <a:t>20</a:t>
             </a:fld>
             <a:endParaRPr lang="en-US"/>
@@ -2199,7 +2199,7 @@
           <a:bodyPr/>
           <a:lstStyle/>
           <a:p>
-            <a:pPr defTabSz="930275"/>
+            <a:pPr defTabSz="964974"/>
             <a:r>
               <a:rPr lang="en-US"/>
               <a:t>Runtime Organization</a:t>
@@ -2224,10 +2224,10 @@
           <a:bodyPr/>
           <a:lstStyle/>
           <a:p>
-            <a:pPr defTabSz="930275"/>
+            <a:pPr defTabSz="964974"/>
             <a:fld id="{836B8560-6F72-4CD3-9FA8-66EEB1BFE126}" type="slidenum">
               <a:rPr lang="en-US" smtClean="0"/>
-              <a:pPr defTabSz="930275"/>
+              <a:pPr defTabSz="964974"/>
               <a:t>2</a:t>
             </a:fld>
             <a:endParaRPr lang="en-US"/>
@@ -2434,7 +2434,7 @@
           <a:bodyPr/>
           <a:lstStyle/>
           <a:p>
-            <a:pPr defTabSz="930275"/>
+            <a:pPr defTabSz="964974"/>
             <a:r>
               <a:rPr lang="en-US"/>
               <a:t>Subprograms</a:t>
@@ -2459,10 +2459,10 @@
           <a:bodyPr/>
           <a:lstStyle/>
           <a:p>
-            <a:pPr defTabSz="930275"/>
+            <a:pPr defTabSz="964974"/>
             <a:fld id="{075CFEEC-27A7-4324-B2F7-29E65C8E0D3B}" type="slidenum">
               <a:rPr lang="en-US" smtClean="0"/>
-              <a:pPr defTabSz="930275"/>
+              <a:pPr defTabSz="964974"/>
               <a:t>23</a:t>
             </a:fld>
             <a:endParaRPr lang="en-US"/>
@@ -2552,7 +2552,7 @@
           <a:bodyPr/>
           <a:lstStyle/>
           <a:p>
-            <a:pPr defTabSz="930275"/>
+            <a:pPr defTabSz="964974"/>
             <a:r>
               <a:rPr lang="en-US"/>
               <a:t>Subprograms</a:t>
@@ -2577,10 +2577,10 @@
           <a:bodyPr/>
           <a:lstStyle/>
           <a:p>
-            <a:pPr defTabSz="930275"/>
+            <a:pPr defTabSz="964974"/>
             <a:fld id="{075CFEEC-27A7-4324-B2F7-29E65C8E0D3B}" type="slidenum">
               <a:rPr lang="en-US" smtClean="0"/>
-              <a:pPr defTabSz="930275"/>
+              <a:pPr defTabSz="964974"/>
               <a:t>27</a:t>
             </a:fld>
             <a:endParaRPr lang="en-US"/>
@@ -2670,7 +2670,7 @@
           <a:bodyPr/>
           <a:lstStyle/>
           <a:p>
-            <a:pPr defTabSz="930275"/>
+            <a:pPr defTabSz="964974"/>
             <a:r>
               <a:rPr lang="en-US"/>
               <a:t>Subprograms</a:t>
@@ -2695,10 +2695,10 @@
           <a:bodyPr/>
           <a:lstStyle/>
           <a:p>
-            <a:pPr defTabSz="930275"/>
+            <a:pPr defTabSz="964974"/>
             <a:fld id="{6AABD8DE-277E-4E2D-975F-03CE0BD20194}" type="slidenum">
               <a:rPr lang="en-US" smtClean="0"/>
-              <a:pPr defTabSz="930275"/>
+              <a:pPr defTabSz="964974"/>
               <a:t>35</a:t>
             </a:fld>
             <a:endParaRPr lang="en-US"/>
@@ -2788,7 +2788,7 @@
           <a:bodyPr/>
           <a:lstStyle/>
           <a:p>
-            <a:pPr defTabSz="930275"/>
+            <a:pPr defTabSz="964974"/>
             <a:r>
               <a:rPr lang="en-US"/>
               <a:t>Subprograms</a:t>
@@ -2813,10 +2813,10 @@
           <a:bodyPr/>
           <a:lstStyle/>
           <a:p>
-            <a:pPr defTabSz="930275"/>
+            <a:pPr defTabSz="964974"/>
             <a:fld id="{D8DD6345-1170-48A5-985B-EC96D61CA5D8}" type="slidenum">
               <a:rPr lang="en-US" smtClean="0"/>
-              <a:pPr defTabSz="930275"/>
+              <a:pPr defTabSz="964974"/>
               <a:t>36</a:t>
             </a:fld>
             <a:endParaRPr lang="en-US"/>
@@ -2906,7 +2906,7 @@
           <a:bodyPr/>
           <a:lstStyle/>
           <a:p>
-            <a:pPr defTabSz="930275"/>
+            <a:pPr defTabSz="964974"/>
             <a:r>
               <a:rPr lang="en-US"/>
               <a:t>Subprograms</a:t>
@@ -2931,10 +2931,10 @@
           <a:bodyPr/>
           <a:lstStyle/>
           <a:p>
-            <a:pPr defTabSz="930275"/>
+            <a:pPr defTabSz="964974"/>
             <a:fld id="{2FDE86E9-4526-4E85-8D5C-6C553B334C97}" type="slidenum">
               <a:rPr lang="en-US" smtClean="0"/>
-              <a:pPr defTabSz="930275"/>
+              <a:pPr defTabSz="964974"/>
               <a:t>39</a:t>
             </a:fld>
             <a:endParaRPr lang="en-US"/>
@@ -3258,7 +3258,7 @@
           <a:bodyPr/>
           <a:lstStyle/>
           <a:p>
-            <a:pPr defTabSz="930275"/>
+            <a:pPr defTabSz="964974"/>
             <a:r>
               <a:rPr lang="en-US"/>
               <a:t>Subprograms</a:t>
@@ -3283,10 +3283,10 @@
           <a:bodyPr/>
           <a:lstStyle/>
           <a:p>
-            <a:pPr defTabSz="930275"/>
+            <a:pPr defTabSz="964974"/>
             <a:fld id="{662CC49B-6813-45E9-B161-6D1C4C664607}" type="slidenum">
               <a:rPr lang="en-US" smtClean="0"/>
-              <a:pPr defTabSz="930275"/>
+              <a:pPr defTabSz="964974"/>
               <a:t>45</a:t>
             </a:fld>
             <a:endParaRPr lang="en-US"/>
@@ -3376,7 +3376,7 @@
           <a:bodyPr/>
           <a:lstStyle/>
           <a:p>
-            <a:pPr defTabSz="930275"/>
+            <a:pPr defTabSz="964974"/>
             <a:r>
               <a:rPr lang="en-US"/>
               <a:t>Subprograms</a:t>
@@ -3401,10 +3401,10 @@
           <a:bodyPr/>
           <a:lstStyle/>
           <a:p>
-            <a:pPr defTabSz="930275"/>
+            <a:pPr defTabSz="964974"/>
             <a:fld id="{93AFA024-7C4D-4338-9A21-2A5F7BE59F73}" type="slidenum">
               <a:rPr lang="en-US" smtClean="0"/>
-              <a:pPr defTabSz="930275"/>
+              <a:pPr defTabSz="964974"/>
               <a:t>47</a:t>
             </a:fld>
             <a:endParaRPr lang="en-US"/>
@@ -3494,7 +3494,7 @@
           <a:bodyPr/>
           <a:lstStyle/>
           <a:p>
-            <a:pPr defTabSz="930275"/>
+            <a:pPr defTabSz="964974"/>
             <a:r>
               <a:rPr lang="en-US"/>
               <a:t>Runtime Organization</a:t>
@@ -3519,10 +3519,10 @@
           <a:bodyPr/>
           <a:lstStyle/>
           <a:p>
-            <a:pPr defTabSz="930275"/>
+            <a:pPr defTabSz="964974"/>
             <a:fld id="{995EBB9F-4EA1-4F12-B672-467C2DE522FF}" type="slidenum">
               <a:rPr lang="en-US" smtClean="0"/>
-              <a:pPr defTabSz="930275"/>
+              <a:pPr defTabSz="964974"/>
               <a:t>3</a:t>
             </a:fld>
             <a:endParaRPr lang="en-US"/>
@@ -3612,7 +3612,7 @@
           <a:bodyPr/>
           <a:lstStyle/>
           <a:p>
-            <a:pPr defTabSz="930275"/>
+            <a:pPr defTabSz="964974"/>
             <a:r>
               <a:rPr lang="en-US"/>
               <a:t>Subprograms</a:t>
@@ -3637,10 +3637,10 @@
           <a:bodyPr/>
           <a:lstStyle/>
           <a:p>
-            <a:pPr defTabSz="930275"/>
+            <a:pPr defTabSz="964974"/>
             <a:fld id="{93AFA024-7C4D-4338-9A21-2A5F7BE59F73}" type="slidenum">
               <a:rPr lang="en-US" smtClean="0"/>
-              <a:pPr defTabSz="930275"/>
+              <a:pPr defTabSz="964974"/>
               <a:t>48</a:t>
             </a:fld>
             <a:endParaRPr lang="en-US"/>
@@ -3964,7 +3964,7 @@
           <a:bodyPr/>
           <a:lstStyle/>
           <a:p>
-            <a:pPr defTabSz="930275"/>
+            <a:pPr defTabSz="964974"/>
             <a:r>
               <a:rPr lang="en-US"/>
               <a:t>Subprograms</a:t>
@@ -3989,10 +3989,10 @@
           <a:bodyPr/>
           <a:lstStyle/>
           <a:p>
-            <a:pPr defTabSz="930275"/>
+            <a:pPr defTabSz="964974"/>
             <a:fld id="{6AABD8DE-277E-4E2D-975F-03CE0BD20194}" type="slidenum">
               <a:rPr lang="en-US" smtClean="0"/>
-              <a:pPr defTabSz="930275"/>
+              <a:pPr defTabSz="964974"/>
               <a:t>51</a:t>
             </a:fld>
             <a:endParaRPr lang="en-US"/>
@@ -4082,7 +4082,7 @@
           <a:bodyPr/>
           <a:lstStyle/>
           <a:p>
-            <a:pPr defTabSz="930275"/>
+            <a:pPr defTabSz="964974"/>
             <a:r>
               <a:rPr lang="en-US"/>
               <a:t>Subprograms</a:t>
@@ -4107,10 +4107,10 @@
           <a:bodyPr/>
           <a:lstStyle/>
           <a:p>
-            <a:pPr defTabSz="930275"/>
+            <a:pPr defTabSz="964974"/>
             <a:fld id="{D8DD6345-1170-48A5-985B-EC96D61CA5D8}" type="slidenum">
               <a:rPr lang="en-US" smtClean="0"/>
-              <a:pPr defTabSz="930275"/>
+              <a:pPr defTabSz="964974"/>
               <a:t>52</a:t>
             </a:fld>
             <a:endParaRPr lang="en-US"/>
@@ -4434,7 +4434,7 @@
           <a:bodyPr/>
           <a:lstStyle/>
           <a:p>
-            <a:pPr defTabSz="930275"/>
+            <a:pPr defTabSz="964974"/>
             <a:r>
               <a:rPr lang="en-US"/>
               <a:t>Subprograms</a:t>
@@ -4459,10 +4459,10 @@
           <a:bodyPr/>
           <a:lstStyle/>
           <a:p>
-            <a:pPr defTabSz="930275"/>
+            <a:pPr defTabSz="964974"/>
             <a:fld id="{6AABD8DE-277E-4E2D-975F-03CE0BD20194}" type="slidenum">
               <a:rPr lang="en-US" smtClean="0"/>
-              <a:pPr defTabSz="930275"/>
+              <a:pPr defTabSz="964974"/>
               <a:t>55</a:t>
             </a:fld>
             <a:endParaRPr lang="en-US"/>
@@ -4552,7 +4552,7 @@
           <a:bodyPr/>
           <a:lstStyle/>
           <a:p>
-            <a:pPr defTabSz="930275"/>
+            <a:pPr defTabSz="964974"/>
             <a:r>
               <a:rPr lang="en-US"/>
               <a:t>Subprograms</a:t>
@@ -4577,10 +4577,10 @@
           <a:bodyPr/>
           <a:lstStyle/>
           <a:p>
-            <a:pPr defTabSz="930275"/>
+            <a:pPr defTabSz="964974"/>
             <a:fld id="{D8DD6345-1170-48A5-985B-EC96D61CA5D8}" type="slidenum">
               <a:rPr lang="en-US" smtClean="0"/>
-              <a:pPr defTabSz="930275"/>
+              <a:pPr defTabSz="964974"/>
               <a:t>56</a:t>
             </a:fld>
             <a:endParaRPr lang="en-US"/>
@@ -4787,7 +4787,7 @@
           <a:bodyPr/>
           <a:lstStyle/>
           <a:p>
-            <a:pPr defTabSz="930275"/>
+            <a:pPr defTabSz="964974"/>
             <a:r>
               <a:rPr lang="en-US"/>
               <a:t>Runtime Organization</a:t>
@@ -4812,10 +4812,10 @@
           <a:bodyPr/>
           <a:lstStyle/>
           <a:p>
-            <a:pPr defTabSz="930275"/>
+            <a:pPr defTabSz="964974"/>
             <a:fld id="{3798D45F-38A7-4BD4-B7D0-C77FD73CC90D}" type="slidenum">
               <a:rPr lang="en-US" smtClean="0"/>
-              <a:pPr defTabSz="930275"/>
+              <a:pPr defTabSz="964974"/>
               <a:t>4</a:t>
             </a:fld>
             <a:endParaRPr lang="en-US"/>
@@ -5022,7 +5022,7 @@
           <a:bodyPr/>
           <a:lstStyle/>
           <a:p>
-            <a:pPr defTabSz="930275"/>
+            <a:pPr defTabSz="964974"/>
             <a:r>
               <a:rPr lang="en-US"/>
               <a:t>Subprograms</a:t>
@@ -5047,10 +5047,10 @@
           <a:bodyPr/>
           <a:lstStyle/>
           <a:p>
-            <a:pPr defTabSz="930275"/>
+            <a:pPr defTabSz="964974"/>
             <a:fld id="{1C8E9440-1093-468D-9FD6-32FEBA553126}" type="slidenum">
               <a:rPr lang="en-US" smtClean="0"/>
-              <a:pPr defTabSz="930275"/>
+              <a:pPr defTabSz="964974"/>
               <a:t>5</a:t>
             </a:fld>
             <a:endParaRPr lang="en-US"/>
@@ -5257,7 +5257,7 @@
           <a:bodyPr/>
           <a:lstStyle/>
           <a:p>
-            <a:pPr defTabSz="930275"/>
+            <a:pPr defTabSz="964974"/>
             <a:r>
               <a:rPr lang="en-US"/>
               <a:t>Subprograms</a:t>
@@ -5282,10 +5282,10 @@
           <a:bodyPr/>
           <a:lstStyle/>
           <a:p>
-            <a:pPr defTabSz="930275"/>
+            <a:pPr defTabSz="964974"/>
             <a:fld id="{6077FC34-8632-4858-AEC5-C715789CDB12}" type="slidenum">
               <a:rPr lang="en-US" smtClean="0"/>
-              <a:pPr defTabSz="930275"/>
+              <a:pPr defTabSz="964974"/>
               <a:t>7</a:t>
             </a:fld>
             <a:endParaRPr lang="en-US"/>
@@ -5375,7 +5375,7 @@
           <a:bodyPr/>
           <a:lstStyle/>
           <a:p>
-            <a:pPr defTabSz="930275"/>
+            <a:pPr defTabSz="964974"/>
             <a:r>
               <a:rPr lang="en-US"/>
               <a:t>Subprograms</a:t>
@@ -5400,10 +5400,10 @@
           <a:bodyPr/>
           <a:lstStyle/>
           <a:p>
-            <a:pPr defTabSz="930275"/>
+            <a:pPr defTabSz="964974"/>
             <a:fld id="{F2253710-3DDE-4A71-970A-B068258D7CFD}" type="slidenum">
               <a:rPr lang="en-US" smtClean="0"/>
-              <a:pPr defTabSz="930275"/>
+              <a:pPr defTabSz="964974"/>
               <a:t>8</a:t>
             </a:fld>
             <a:endParaRPr lang="en-US"/>
@@ -5493,7 +5493,7 @@
           <a:bodyPr/>
           <a:lstStyle/>
           <a:p>
-            <a:pPr defTabSz="930275"/>
+            <a:pPr defTabSz="964974"/>
             <a:r>
               <a:rPr lang="en-US"/>
               <a:t>Subprograms</a:t>
@@ -5518,10 +5518,10 @@
           <a:bodyPr/>
           <a:lstStyle/>
           <a:p>
-            <a:pPr defTabSz="930275"/>
+            <a:pPr defTabSz="964974"/>
             <a:fld id="{EB7972A9-078D-4C96-9A05-F5C8A4AEC107}" type="slidenum">
               <a:rPr lang="en-US" smtClean="0"/>
-              <a:pPr defTabSz="930275"/>
+              <a:pPr defTabSz="964974"/>
               <a:t>11</a:t>
             </a:fld>
             <a:endParaRPr lang="en-US"/>
@@ -8832,8 +8832,8 @@
         </p:nvSpPr>
         <p:spPr>
           <a:xfrm>
-            <a:off x="2911602" y="4626114"/>
-            <a:ext cx="5117106" cy="707886"/>
+            <a:off x="2819400" y="4626114"/>
+            <a:ext cx="5622052" cy="769441"/>
           </a:xfrm>
           <a:prstGeom prst="rect">
             <a:avLst/>
@@ -8853,54 +8853,54 @@
           <a:p>
             <a:pPr algn="l"/>
             <a:r>
-              <a:rPr lang="en-US" sz="2000" dirty="0"/>
+              <a:rPr lang="en-US" sz="2200" dirty="0"/>
               <a:t>Note:  </a:t>
             </a:r>
             <a:r>
-              <a:rPr lang="en-US" sz="2000" dirty="0" err="1">
+              <a:rPr lang="en-US" sz="2200" dirty="0" err="1">
                 <a:latin typeface="Consolas" panose="020B0609020204030204" pitchFamily="49" charset="0"/>
               </a:rPr>
               <a:t>ScopeLevel</a:t>
             </a:r>
             <a:r>
-              <a:rPr lang="en-US" sz="2000" dirty="0"/>
+              <a:rPr lang="en-US" sz="2200" dirty="0"/>
               <a:t> is an </a:t>
             </a:r>
             <a:r>
-              <a:rPr lang="en-US" sz="2000" dirty="0" err="1">
+              <a:rPr lang="en-US" sz="2200" dirty="0" err="1">
                 <a:latin typeface="Consolas" panose="020B0609020204030204" pitchFamily="49" charset="0"/>
               </a:rPr>
               <a:t>enum</a:t>
             </a:r>
             <a:r>
-              <a:rPr lang="en-US" sz="2000" dirty="0"/>
+              <a:rPr lang="en-US" sz="2200" dirty="0"/>
               <a:t> class with</a:t>
             </a:r>
           </a:p>
           <a:p>
             <a:pPr algn="l"/>
             <a:r>
-              <a:rPr lang="en-US" sz="2000" dirty="0"/>
+              <a:rPr lang="en-US" sz="2200" dirty="0"/>
               <a:t>only two values, </a:t>
             </a:r>
             <a:r>
-              <a:rPr lang="en-US" sz="2000" dirty="0">
+              <a:rPr lang="en-US" sz="2200" dirty="0">
                 <a:latin typeface="Consolas" panose="020B0609020204030204" pitchFamily="49" charset="0"/>
               </a:rPr>
               <a:t>PROGRAM</a:t>
             </a:r>
             <a:r>
-              <a:rPr lang="en-US" sz="2000" dirty="0"/>
+              <a:rPr lang="en-US" sz="2200" dirty="0"/>
               <a:t> and </a:t>
             </a:r>
             <a:r>
-              <a:rPr lang="en-US" sz="2000" dirty="0">
+              <a:rPr lang="en-US" sz="2200" dirty="0">
                 <a:latin typeface="Consolas" panose="020B0609020204030204" pitchFamily="49" charset="0"/>
               </a:rPr>
               <a:t>SUBPROGRAM</a:t>
             </a:r>
             <a:r>
-              <a:rPr lang="en-US" sz="2000" dirty="0"/>
+              <a:rPr lang="en-US" sz="2200" dirty="0"/>
               <a:t>.</a:t>
             </a:r>
           </a:p>
@@ -8979,7 +8979,7 @@
         <p:spPr bwMode="auto">
           <a:xfrm rot="10800000">
             <a:off x="2227750" y="4303385"/>
-            <a:ext cx="683853" cy="676673"/>
+            <a:ext cx="591651" cy="707451"/>
           </a:xfrm>
           <a:prstGeom prst="bentConnector2">
             <a:avLst/>
@@ -9166,8 +9166,8 @@
         </p:nvSpPr>
         <p:spPr bwMode="auto">
           <a:xfrm>
-            <a:off x="2226807" y="5334000"/>
-            <a:ext cx="4690387" cy="400752"/>
+            <a:off x="1219323" y="5318612"/>
+            <a:ext cx="6705362" cy="431529"/>
           </a:xfrm>
           <a:prstGeom prst="rect">
             <a:avLst/>
@@ -9210,7 +9210,7 @@
               <a:tabLst/>
             </a:pPr>
             <a:r>
-              <a:rPr kumimoji="0" lang="en-US" sz="2000" b="0" i="0" u="none" strike="noStrike" cap="none" normalizeH="0" dirty="0">
+              <a:rPr kumimoji="0" lang="en-US" sz="2200" b="0" i="0" u="none" strike="noStrike" cap="none" normalizeH="0" dirty="0">
                 <a:ln>
                   <a:noFill/>
                 </a:ln>
@@ -9223,17 +9223,30 @@
               <a:t>*Handled by the parser </a:t>
             </a:r>
             <a:r>
-              <a:rPr lang="en-US" sz="2000" dirty="0"/>
+              <a:rPr lang="en-US" sz="2200" dirty="0"/>
               <a:t>using </a:t>
             </a:r>
             <a:r>
-              <a:rPr lang="en-US" sz="2000" dirty="0">
+              <a:rPr lang="en-US" sz="2200" dirty="0" err="1">
+                <a:latin typeface="Consolas" pitchFamily="49" charset="0"/>
+              </a:rPr>
+              <a:t>SubprogramC</a:t>
+            </a:r>
+            <a:r>
+              <a:rPr lang="en-US" sz="2200" dirty="0" err="1">
                 <a:latin typeface="Consolas" pitchFamily="49" charset="0"/>
                 <a:cs typeface="Consolas" pitchFamily="49" charset="0"/>
               </a:rPr>
-              <a:t>Context.</a:t>
-            </a:r>
-            <a:endParaRPr kumimoji="0" lang="en-US" sz="2000" b="0" i="0" u="none" strike="noStrike" cap="none" normalizeH="0" baseline="0" dirty="0">
+              <a:t>ontext</a:t>
+            </a:r>
+            <a:r>
+              <a:rPr lang="en-US" sz="2200" dirty="0">
+                <a:latin typeface="Consolas" pitchFamily="49" charset="0"/>
+                <a:cs typeface="Consolas" pitchFamily="49" charset="0"/>
+              </a:rPr>
+              <a:t>.</a:t>
+            </a:r>
+            <a:endParaRPr kumimoji="0" lang="en-US" sz="2200" b="0" i="0" u="none" strike="noStrike" cap="none" normalizeH="0" baseline="0" dirty="0">
               <a:ln>
                 <a:noFill/>
               </a:ln>
@@ -9807,8 +9820,8 @@
         </p:nvSpPr>
         <p:spPr>
           <a:xfrm>
-            <a:off x="1904026" y="4648200"/>
-            <a:ext cx="5101076" cy="738664"/>
+            <a:off x="1896428" y="4495800"/>
+            <a:ext cx="5351145" cy="769441"/>
           </a:xfrm>
           <a:prstGeom prst="rect">
             <a:avLst/>
@@ -9828,14 +9841,14 @@
           <a:p>
             <a:pPr algn="l"/>
             <a:r>
-              <a:rPr lang="en-US" sz="2100" dirty="0"/>
+              <a:rPr lang="en-US" sz="2200" dirty="0"/>
               <a:t>Note that CVM does not have separate</a:t>
             </a:r>
           </a:p>
           <a:p>
             <a:pPr algn="l"/>
             <a:r>
-              <a:rPr lang="en-US" sz="2100" dirty="0"/>
+              <a:rPr lang="en-US" sz="2200" dirty="0"/>
               <a:t>instructions for procedures and functions.</a:t>
             </a:r>
           </a:p>
@@ -9998,8 +10011,8 @@
         </p:nvSpPr>
         <p:spPr>
           <a:xfrm>
-            <a:off x="1133398" y="4953000"/>
-            <a:ext cx="6877204" cy="830997"/>
+            <a:off x="1410718" y="4953000"/>
+            <a:ext cx="6322565" cy="769441"/>
           </a:xfrm>
           <a:prstGeom prst="rect">
             <a:avLst/>
@@ -10019,14 +10032,14 @@
           <a:p>
             <a:pPr algn="l"/>
             <a:r>
-              <a:rPr lang="en-US" dirty="0"/>
+              <a:rPr lang="en-US" sz="2200" dirty="0"/>
               <a:t>An active subprogram is one for which this space</a:t>
             </a:r>
           </a:p>
           <a:p>
             <a:pPr algn="l"/>
             <a:r>
-              <a:rPr lang="en-US" dirty="0"/>
+              <a:rPr lang="en-US" sz="2200" dirty="0"/>
               <a:t> (activation record) is currently on the stack.</a:t>
             </a:r>
           </a:p>
@@ -10888,8 +10901,8 @@
         </p:nvSpPr>
         <p:spPr bwMode="auto">
           <a:xfrm>
-            <a:off x="1256413" y="3505200"/>
-            <a:ext cx="6631174" cy="1569660"/>
+            <a:off x="1523858" y="3505200"/>
+            <a:ext cx="6096284" cy="1446550"/>
           </a:xfrm>
           <a:prstGeom prst="rect">
             <a:avLst/>
@@ -10912,28 +10925,28 @@
           <a:p>
             <a:pPr algn="l"/>
             <a:r>
-              <a:rPr lang="en-US" dirty="0"/>
+              <a:rPr lang="en-US" sz="2200" dirty="0"/>
               <a:t>The values for BP and PC relative to the calling</a:t>
             </a:r>
           </a:p>
           <a:p>
             <a:pPr algn="l"/>
             <a:r>
-              <a:rPr lang="en-US" dirty="0"/>
+              <a:rPr lang="en-US" sz="2200" dirty="0"/>
               <a:t>subprogram are saved (pushed) onto the stack</a:t>
             </a:r>
           </a:p>
           <a:p>
             <a:pPr algn="l"/>
             <a:r>
-              <a:rPr lang="en-US" dirty="0"/>
+              <a:rPr lang="en-US" sz="2200" dirty="0"/>
               <a:t>by the CVM “CALL” instruction, and they</a:t>
             </a:r>
           </a:p>
           <a:p>
             <a:pPr algn="l"/>
             <a:r>
-              <a:rPr lang="en-US" dirty="0"/>
+              <a:rPr lang="en-US" sz="2200" dirty="0"/>
               <a:t>are restored by the CVM “RET” instruction.</a:t>
             </a:r>
           </a:p>
@@ -23731,7 +23744,7 @@
               <a:t> method of class </a:t>
             </a:r>
             <a:r>
-              <a:rPr lang="en-US" dirty="0" err="1">
+              <a:rPr lang="en-US" dirty="0">
                 <a:latin typeface="Consolas" pitchFamily="49" charset="0"/>
                 <a:cs typeface="Consolas" pitchFamily="49" charset="0"/>
               </a:rPr>
@@ -24253,8 +24266,8 @@
         </p:nvSpPr>
         <p:spPr>
           <a:xfrm>
-            <a:off x="1151031" y="4629090"/>
-            <a:ext cx="6841938" cy="400110"/>
+            <a:off x="807989" y="4629090"/>
+            <a:ext cx="7528023" cy="430887"/>
           </a:xfrm>
           <a:prstGeom prst="rect">
             <a:avLst/>
@@ -24273,35 +24286,35 @@
           <a:lstStyle/>
           <a:p>
             <a:r>
-              <a:rPr lang="en-US" sz="2000" dirty="0">
+              <a:rPr lang="en-US" sz="2200" dirty="0">
                 <a:latin typeface="+mn-lt"/>
                 <a:cs typeface="Consolas" pitchFamily="49" charset="0"/>
               </a:rPr>
               <a:t>(in method </a:t>
             </a:r>
             <a:r>
-              <a:rPr lang="en-US" sz="2000" dirty="0">
+              <a:rPr lang="en-US" sz="2200" dirty="0">
                 <a:latin typeface="Consolas" panose="020B0609020204030204" pitchFamily="49" charset="0"/>
                 <a:cs typeface="Consolas" pitchFamily="49" charset="0"/>
               </a:rPr>
               <a:t>checkConstraints()</a:t>
             </a:r>
             <a:r>
-              <a:rPr lang="en-US" sz="2000" dirty="0">
+              <a:rPr lang="en-US" sz="2200" dirty="0">
                 <a:latin typeface="+mn-lt"/>
                 <a:cs typeface="Consolas" pitchFamily="49" charset="0"/>
               </a:rPr>
               <a:t> of </a:t>
             </a:r>
             <a:r>
-              <a:rPr lang="en-US" sz="2000" dirty="0">
+              <a:rPr lang="en-US" sz="2200" dirty="0">
                 <a:latin typeface="Consolas" panose="020B0609020204030204" pitchFamily="49" charset="0"/>
                 <a:cs typeface="Consolas" pitchFamily="49" charset="0"/>
               </a:rPr>
               <a:t>ProcedureCallStmt</a:t>
             </a:r>
             <a:r>
-              <a:rPr lang="en-US" sz="2000" dirty="0">
+              <a:rPr lang="en-US" sz="2200" dirty="0">
                 <a:latin typeface="+mn-lt"/>
                 <a:cs typeface="Consolas" pitchFamily="49" charset="0"/>
               </a:rPr>
@@ -24761,8 +24774,8 @@
         </p:nvSpPr>
         <p:spPr>
           <a:xfrm>
-            <a:off x="1151031" y="5852435"/>
-            <a:ext cx="6841938" cy="400110"/>
+            <a:off x="807989" y="5862595"/>
+            <a:ext cx="7528023" cy="430887"/>
           </a:xfrm>
           <a:prstGeom prst="rect">
             <a:avLst/>
@@ -24781,35 +24794,35 @@
           <a:lstStyle/>
           <a:p>
             <a:r>
-              <a:rPr lang="en-US" sz="2000" dirty="0">
+              <a:rPr lang="en-US" sz="2200" dirty="0">
                 <a:latin typeface="+mn-lt"/>
                 <a:cs typeface="Consolas" pitchFamily="49" charset="0"/>
               </a:rPr>
               <a:t>(in method </a:t>
             </a:r>
             <a:r>
-              <a:rPr lang="en-US" sz="2000" dirty="0">
+              <a:rPr lang="en-US" sz="2200" dirty="0">
                 <a:latin typeface="Consolas" panose="020B0609020204030204" pitchFamily="49" charset="0"/>
                 <a:cs typeface="Consolas" pitchFamily="49" charset="0"/>
               </a:rPr>
               <a:t>checkConstraints()</a:t>
             </a:r>
             <a:r>
-              <a:rPr lang="en-US" sz="2000" dirty="0">
+              <a:rPr lang="en-US" sz="2200" dirty="0">
                 <a:latin typeface="+mn-lt"/>
                 <a:cs typeface="Consolas" pitchFamily="49" charset="0"/>
               </a:rPr>
               <a:t> of </a:t>
             </a:r>
             <a:r>
-              <a:rPr lang="en-US" sz="2000" dirty="0">
+              <a:rPr lang="en-US" sz="2200" dirty="0">
                 <a:latin typeface="Consolas" panose="020B0609020204030204" pitchFamily="49" charset="0"/>
                 <a:cs typeface="Consolas" pitchFamily="49" charset="0"/>
               </a:rPr>
               <a:t>ProcedureCallStmt</a:t>
             </a:r>
             <a:r>
-              <a:rPr lang="en-US" sz="2000" dirty="0">
+              <a:rPr lang="en-US" sz="2200" dirty="0">
                 <a:latin typeface="+mn-lt"/>
                 <a:cs typeface="Consolas" pitchFamily="49" charset="0"/>
               </a:rPr>
@@ -29891,8 +29904,8 @@
         </p:nvSpPr>
         <p:spPr>
           <a:xfrm>
-            <a:off x="1868251" y="5257800"/>
-            <a:ext cx="5407506" cy="400110"/>
+            <a:off x="1598049" y="5257800"/>
+            <a:ext cx="5947911" cy="430887"/>
           </a:xfrm>
           <a:prstGeom prst="rect">
             <a:avLst/>
@@ -29911,17 +29924,17 @@
           <a:lstStyle/>
           <a:p>
             <a:r>
-              <a:rPr lang="en-US" sz="2000" dirty="0"/>
+              <a:rPr lang="en-US" sz="2200" dirty="0"/>
               <a:t>Note that parameter </a:t>
             </a:r>
             <a:r>
-              <a:rPr lang="en-US" sz="2000" dirty="0">
+              <a:rPr lang="en-US" sz="2200" dirty="0">
                 <a:latin typeface="Consolas" panose="020B0609020204030204" pitchFamily="49" charset="0"/>
               </a:rPr>
               <a:t>a</a:t>
             </a:r>
             <a:r>
-              <a:rPr lang="en-US" sz="2000" dirty="0"/>
+              <a:rPr lang="en-US" sz="2200" dirty="0"/>
               <a:t> is a variable parameter.</a:t>
             </a:r>
           </a:p>
@@ -33257,8 +33270,8 @@
         </p:nvSpPr>
         <p:spPr>
           <a:xfrm>
-            <a:off x="2193785" y="5496339"/>
-            <a:ext cx="4756430" cy="707886"/>
+            <a:off x="1960548" y="5534839"/>
+            <a:ext cx="5222905" cy="769441"/>
           </a:xfrm>
           <a:prstGeom prst="rect">
             <a:avLst/>
@@ -33278,14 +33291,14 @@
           <a:p>
             <a:pPr algn="l"/>
             <a:r>
-              <a:rPr lang="en-US" sz="2000" dirty="0"/>
+              <a:rPr lang="en-US" sz="2200" dirty="0"/>
               <a:t>We will extend this method again when</a:t>
             </a:r>
             <a:br>
-              <a:rPr lang="en-US" sz="2000" dirty="0"/>
+              <a:rPr lang="en-US" sz="2200" dirty="0"/>
             </a:br>
             <a:r>
-              <a:rPr lang="en-US" sz="2000" dirty="0"/>
+              <a:rPr lang="en-US" sz="2200" dirty="0"/>
               <a:t>we consider the topic of arrays in CPRL.</a:t>
             </a:r>
           </a:p>
@@ -34862,8 +34875,8 @@
         </p:nvSpPr>
         <p:spPr>
           <a:xfrm>
-            <a:off x="1709678" y="5257800"/>
-            <a:ext cx="5724644" cy="707886"/>
+            <a:off x="1425145" y="5257800"/>
+            <a:ext cx="6293711" cy="769441"/>
           </a:xfrm>
           <a:prstGeom prst="rect">
             <a:avLst/>
@@ -34883,25 +34896,25 @@
           <a:p>
             <a:pPr algn="l"/>
             <a:r>
-              <a:rPr lang="en-US" sz="2000" dirty="0"/>
+              <a:rPr lang="en-US" sz="2200" dirty="0"/>
               <a:t>What value is printed?  If “</a:t>
             </a:r>
             <a:r>
-              <a:rPr lang="en-US" sz="2000" dirty="0">
+              <a:rPr lang="en-US" sz="2200" dirty="0">
                 <a:latin typeface="Consolas" pitchFamily="49" charset="0"/>
                 <a:cs typeface="Consolas" pitchFamily="49" charset="0"/>
               </a:rPr>
               <a:t>var</a:t>
             </a:r>
             <a:r>
-              <a:rPr lang="en-US" sz="2000" dirty="0"/>
+              <a:rPr lang="en-US" sz="2200" dirty="0"/>
               <a:t>” is removed from</a:t>
             </a:r>
           </a:p>
           <a:p>
             <a:pPr algn="l"/>
             <a:r>
-              <a:rPr lang="en-US" sz="2000" dirty="0"/>
+              <a:rPr lang="en-US" sz="2200" dirty="0"/>
               <a:t>the parameter declaration, what value is printed?</a:t>
             </a:r>
           </a:p>

</xml_diff>

<commit_message>
minor corrections to 2 slides
</commit_message>
<xml_diff>
--- a/PowerPoint Slides/13 - Subprograms.pptx
+++ b/PowerPoint Slides/13 - Subprograms.pptx
@@ -267,7 +267,7 @@
         </p:nvSpPr>
         <p:spPr bwMode="auto">
           <a:xfrm>
-            <a:off x="4144618" y="0"/>
+            <a:off x="4144619" y="0"/>
             <a:ext cx="3170583" cy="480388"/>
           </a:xfrm>
           <a:prstGeom prst="rect">
@@ -283,13 +283,13 @@
           <a:effectLst/>
         </p:spPr>
         <p:txBody>
-          <a:bodyPr vert="horz" wrap="square" lIns="96643" tIns="48322" rIns="96643" bIns="48322" numCol="1" anchor="t" anchorCtr="0" compatLnSpc="1">
+          <a:bodyPr vert="horz" wrap="square" lIns="96629" tIns="48315" rIns="96629" bIns="48315" numCol="1" anchor="t" anchorCtr="0" compatLnSpc="1">
             <a:prstTxWarp prst="textNoShape">
               <a:avLst/>
             </a:prstTxWarp>
           </a:bodyPr>
           <a:lstStyle>
-            <a:lvl1pPr algn="r" defTabSz="966421">
+            <a:lvl1pPr algn="r" defTabSz="966279">
               <a:defRPr sz="1200"/>
             </a:lvl1pPr>
           </a:lstStyle>
@@ -318,7 +318,7 @@
         </p:nvSpPr>
         <p:spPr bwMode="auto">
           <a:xfrm>
-            <a:off x="4144618" y="9120813"/>
+            <a:off x="4144619" y="9120814"/>
             <a:ext cx="3170583" cy="480387"/>
           </a:xfrm>
           <a:prstGeom prst="rect">
@@ -334,13 +334,13 @@
           <a:effectLst/>
         </p:spPr>
         <p:txBody>
-          <a:bodyPr vert="horz" wrap="square" lIns="96643" tIns="48322" rIns="96643" bIns="48322" numCol="1" anchor="b" anchorCtr="0" compatLnSpc="1">
+          <a:bodyPr vert="horz" wrap="square" lIns="96629" tIns="48315" rIns="96629" bIns="48315" numCol="1" anchor="b" anchorCtr="0" compatLnSpc="1">
             <a:prstTxWarp prst="textNoShape">
               <a:avLst/>
             </a:prstTxWarp>
           </a:bodyPr>
           <a:lstStyle>
-            <a:lvl1pPr algn="r" defTabSz="966421">
+            <a:lvl1pPr algn="r" defTabSz="966279">
               <a:defRPr sz="1200"/>
             </a:lvl1pPr>
           </a:lstStyle>
@@ -418,7 +418,7 @@
         </p:nvSpPr>
         <p:spPr bwMode="auto">
           <a:xfrm>
-            <a:off x="0" y="0"/>
+            <a:off x="1" y="0"/>
             <a:ext cx="3170583" cy="480388"/>
           </a:xfrm>
           <a:prstGeom prst="rect">
@@ -434,13 +434,13 @@
           <a:effectLst/>
         </p:spPr>
         <p:txBody>
-          <a:bodyPr vert="horz" wrap="square" lIns="96643" tIns="48322" rIns="96643" bIns="48322" numCol="1" anchor="t" anchorCtr="0" compatLnSpc="1">
+          <a:bodyPr vert="horz" wrap="square" lIns="96629" tIns="48315" rIns="96629" bIns="48315" numCol="1" anchor="t" anchorCtr="0" compatLnSpc="1">
             <a:prstTxWarp prst="textNoShape">
               <a:avLst/>
             </a:prstTxWarp>
           </a:bodyPr>
           <a:lstStyle>
-            <a:lvl1pPr algn="l" defTabSz="966421">
+            <a:lvl1pPr algn="l" defTabSz="966279">
               <a:defRPr sz="1200"/>
             </a:lvl1pPr>
           </a:lstStyle>
@@ -467,7 +467,7 @@
         </p:nvSpPr>
         <p:spPr bwMode="auto">
           <a:xfrm>
-            <a:off x="4144618" y="0"/>
+            <a:off x="4144619" y="0"/>
             <a:ext cx="3170583" cy="480388"/>
           </a:xfrm>
           <a:prstGeom prst="rect">
@@ -483,13 +483,13 @@
           <a:effectLst/>
         </p:spPr>
         <p:txBody>
-          <a:bodyPr vert="horz" wrap="square" lIns="96643" tIns="48322" rIns="96643" bIns="48322" numCol="1" anchor="t" anchorCtr="0" compatLnSpc="1">
+          <a:bodyPr vert="horz" wrap="square" lIns="96629" tIns="48315" rIns="96629" bIns="48315" numCol="1" anchor="t" anchorCtr="0" compatLnSpc="1">
             <a:prstTxWarp prst="textNoShape">
               <a:avLst/>
             </a:prstTxWarp>
           </a:bodyPr>
           <a:lstStyle>
-            <a:lvl1pPr algn="r" defTabSz="966421">
+            <a:lvl1pPr algn="r" defTabSz="966279">
               <a:defRPr sz="1200"/>
             </a:lvl1pPr>
           </a:lstStyle>
@@ -542,7 +542,7 @@
         </p:nvSpPr>
         <p:spPr bwMode="auto">
           <a:xfrm>
-            <a:off x="975693" y="4561226"/>
+            <a:off x="975694" y="4561227"/>
             <a:ext cx="5363817" cy="4320213"/>
           </a:xfrm>
           <a:prstGeom prst="rect">
@@ -558,7 +558,7 @@
           <a:effectLst/>
         </p:spPr>
         <p:txBody>
-          <a:bodyPr vert="horz" wrap="square" lIns="96643" tIns="48322" rIns="96643" bIns="48322" numCol="1" anchor="t" anchorCtr="0" compatLnSpc="1">
+          <a:bodyPr vert="horz" wrap="square" lIns="96629" tIns="48315" rIns="96629" bIns="48315" numCol="1" anchor="t" anchorCtr="0" compatLnSpc="1">
             <a:prstTxWarp prst="textNoShape">
               <a:avLst/>
             </a:prstTxWarp>
@@ -613,7 +613,7 @@
         </p:nvSpPr>
         <p:spPr bwMode="auto">
           <a:xfrm>
-            <a:off x="0" y="9120813"/>
+            <a:off x="1" y="9120814"/>
             <a:ext cx="3170583" cy="480387"/>
           </a:xfrm>
           <a:prstGeom prst="rect">
@@ -629,13 +629,13 @@
           <a:effectLst/>
         </p:spPr>
         <p:txBody>
-          <a:bodyPr vert="horz" wrap="square" lIns="96643" tIns="48322" rIns="96643" bIns="48322" numCol="1" anchor="b" anchorCtr="0" compatLnSpc="1">
+          <a:bodyPr vert="horz" wrap="square" lIns="96629" tIns="48315" rIns="96629" bIns="48315" numCol="1" anchor="b" anchorCtr="0" compatLnSpc="1">
             <a:prstTxWarp prst="textNoShape">
               <a:avLst/>
             </a:prstTxWarp>
           </a:bodyPr>
           <a:lstStyle>
-            <a:lvl1pPr algn="l" defTabSz="966421">
+            <a:lvl1pPr algn="l" defTabSz="966279">
               <a:defRPr sz="1200"/>
             </a:lvl1pPr>
           </a:lstStyle>
@@ -659,7 +659,7 @@
         </p:nvSpPr>
         <p:spPr bwMode="auto">
           <a:xfrm>
-            <a:off x="4144618" y="9120813"/>
+            <a:off x="4144619" y="9120814"/>
             <a:ext cx="3170583" cy="480387"/>
           </a:xfrm>
           <a:prstGeom prst="rect">
@@ -675,13 +675,13 @@
           <a:effectLst/>
         </p:spPr>
         <p:txBody>
-          <a:bodyPr vert="horz" wrap="square" lIns="96643" tIns="48322" rIns="96643" bIns="48322" numCol="1" anchor="b" anchorCtr="0" compatLnSpc="1">
+          <a:bodyPr vert="horz" wrap="square" lIns="96629" tIns="48315" rIns="96629" bIns="48315" numCol="1" anchor="b" anchorCtr="0" compatLnSpc="1">
             <a:prstTxWarp prst="textNoShape">
               <a:avLst/>
             </a:prstTxWarp>
           </a:bodyPr>
           <a:lstStyle>
-            <a:lvl1pPr algn="r" defTabSz="966421">
+            <a:lvl1pPr algn="r" defTabSz="966279">
               <a:defRPr sz="1200"/>
             </a:lvl1pPr>
           </a:lstStyle>
@@ -868,7 +868,7 @@
           <a:bodyPr/>
           <a:lstStyle/>
           <a:p>
-            <a:pPr defTabSz="964974"/>
+            <a:pPr defTabSz="964832"/>
             <a:r>
               <a:rPr lang="en-US"/>
               <a:t>Subprograms</a:t>
@@ -893,10 +893,10 @@
           <a:bodyPr/>
           <a:lstStyle/>
           <a:p>
-            <a:pPr defTabSz="964974"/>
+            <a:pPr defTabSz="964832"/>
             <a:fld id="{92CAFDEE-A529-4113-A992-ABDE1DFB9186}" type="slidenum">
               <a:rPr lang="en-US" smtClean="0"/>
-              <a:pPr defTabSz="964974"/>
+              <a:pPr defTabSz="964832"/>
               <a:t>1</a:t>
             </a:fld>
             <a:endParaRPr lang="en-US"/>
@@ -1023,7 +1023,7 @@
           <a:bodyPr/>
           <a:lstStyle/>
           <a:p>
-            <a:pPr defTabSz="964974"/>
+            <a:pPr defTabSz="964832"/>
             <a:r>
               <a:rPr lang="en-US"/>
               <a:t>Subprograms</a:t>
@@ -1048,10 +1048,10 @@
           <a:bodyPr/>
           <a:lstStyle/>
           <a:p>
-            <a:pPr defTabSz="964974"/>
+            <a:pPr defTabSz="964832"/>
             <a:fld id="{EB7972A9-078D-4C96-9A05-F5C8A4AEC107}" type="slidenum">
               <a:rPr lang="en-US" smtClean="0"/>
-              <a:pPr defTabSz="964974"/>
+              <a:pPr defTabSz="964832"/>
               <a:t>12</a:t>
             </a:fld>
             <a:endParaRPr lang="en-US"/>
@@ -1375,7 +1375,7 @@
           <a:bodyPr/>
           <a:lstStyle/>
           <a:p>
-            <a:pPr defTabSz="966529"/>
+            <a:pPr defTabSz="966387"/>
             <a:r>
               <a:rPr lang="en-US" dirty="0"/>
               <a:t>Constraint Analysis</a:t>
@@ -1400,10 +1400,10 @@
           <a:bodyPr/>
           <a:lstStyle/>
           <a:p>
-            <a:pPr defTabSz="966529"/>
+            <a:pPr defTabSz="966387"/>
             <a:fld id="{14BBFF45-95E4-44E8-9F2E-8B751949D653}" type="slidenum">
               <a:rPr lang="en-US" smtClean="0"/>
-              <a:pPr defTabSz="966529"/>
+              <a:pPr defTabSz="966387"/>
               <a:t>15</a:t>
             </a:fld>
             <a:endParaRPr lang="en-US" dirty="0"/>
@@ -1610,7 +1610,7 @@
           <a:bodyPr/>
           <a:lstStyle/>
           <a:p>
-            <a:pPr defTabSz="964974"/>
+            <a:pPr defTabSz="964832"/>
             <a:r>
               <a:rPr lang="en-US"/>
               <a:t>Subprograms</a:t>
@@ -1635,10 +1635,10 @@
           <a:bodyPr/>
           <a:lstStyle/>
           <a:p>
-            <a:pPr defTabSz="964974"/>
+            <a:pPr defTabSz="964832"/>
             <a:fld id="{E3C060E8-07A0-4097-86CE-B741702B405C}" type="slidenum">
               <a:rPr lang="en-US" smtClean="0"/>
-              <a:pPr defTabSz="964974"/>
+              <a:pPr defTabSz="964832"/>
               <a:t>17</a:t>
             </a:fld>
             <a:endParaRPr lang="en-US"/>
@@ -1728,7 +1728,7 @@
           <a:bodyPr/>
           <a:lstStyle/>
           <a:p>
-            <a:pPr defTabSz="964974"/>
+            <a:pPr defTabSz="964832"/>
             <a:r>
               <a:rPr lang="en-US"/>
               <a:t>Subprograms</a:t>
@@ -1753,10 +1753,10 @@
           <a:bodyPr/>
           <a:lstStyle/>
           <a:p>
-            <a:pPr defTabSz="964974"/>
+            <a:pPr defTabSz="964832"/>
             <a:fld id="{E3C060E8-07A0-4097-86CE-B741702B405C}" type="slidenum">
               <a:rPr lang="en-US" smtClean="0"/>
-              <a:pPr defTabSz="964974"/>
+              <a:pPr defTabSz="964832"/>
               <a:t>18</a:t>
             </a:fld>
             <a:endParaRPr lang="en-US"/>
@@ -1846,7 +1846,7 @@
           <a:bodyPr/>
           <a:lstStyle/>
           <a:p>
-            <a:pPr defTabSz="964974"/>
+            <a:pPr defTabSz="964832"/>
             <a:r>
               <a:rPr lang="en-US"/>
               <a:t>Subprograms</a:t>
@@ -1871,10 +1871,10 @@
           <a:bodyPr/>
           <a:lstStyle/>
           <a:p>
-            <a:pPr defTabSz="964974"/>
+            <a:pPr defTabSz="964832"/>
             <a:fld id="{CFD82E65-4A99-464B-9822-320074BC2484}" type="slidenum">
               <a:rPr lang="en-US" smtClean="0"/>
-              <a:pPr defTabSz="964974"/>
+              <a:pPr defTabSz="964832"/>
               <a:t>19</a:t>
             </a:fld>
             <a:endParaRPr lang="en-US"/>
@@ -1964,7 +1964,7 @@
           <a:bodyPr/>
           <a:lstStyle/>
           <a:p>
-            <a:pPr defTabSz="964974"/>
+            <a:pPr defTabSz="964832"/>
             <a:r>
               <a:rPr lang="en-US"/>
               <a:t>Subprograms</a:t>
@@ -1989,10 +1989,10 @@
           <a:bodyPr/>
           <a:lstStyle/>
           <a:p>
-            <a:pPr defTabSz="964974"/>
+            <a:pPr defTabSz="964832"/>
             <a:fld id="{275314F5-DC0F-409F-8DD6-E8BBC59DC18E}" type="slidenum">
               <a:rPr lang="en-US" smtClean="0"/>
-              <a:pPr defTabSz="964974"/>
+              <a:pPr defTabSz="964832"/>
               <a:t>20</a:t>
             </a:fld>
             <a:endParaRPr lang="en-US"/>
@@ -2199,7 +2199,7 @@
           <a:bodyPr/>
           <a:lstStyle/>
           <a:p>
-            <a:pPr defTabSz="964974"/>
+            <a:pPr defTabSz="964832"/>
             <a:r>
               <a:rPr lang="en-US"/>
               <a:t>Runtime Organization</a:t>
@@ -2224,10 +2224,10 @@
           <a:bodyPr/>
           <a:lstStyle/>
           <a:p>
-            <a:pPr defTabSz="964974"/>
+            <a:pPr defTabSz="964832"/>
             <a:fld id="{836B8560-6F72-4CD3-9FA8-66EEB1BFE126}" type="slidenum">
               <a:rPr lang="en-US" smtClean="0"/>
-              <a:pPr defTabSz="964974"/>
+              <a:pPr defTabSz="964832"/>
               <a:t>2</a:t>
             </a:fld>
             <a:endParaRPr lang="en-US"/>
@@ -2434,7 +2434,7 @@
           <a:bodyPr/>
           <a:lstStyle/>
           <a:p>
-            <a:pPr defTabSz="964974"/>
+            <a:pPr defTabSz="964832"/>
             <a:r>
               <a:rPr lang="en-US"/>
               <a:t>Subprograms</a:t>
@@ -2459,10 +2459,10 @@
           <a:bodyPr/>
           <a:lstStyle/>
           <a:p>
-            <a:pPr defTabSz="964974"/>
+            <a:pPr defTabSz="964832"/>
             <a:fld id="{075CFEEC-27A7-4324-B2F7-29E65C8E0D3B}" type="slidenum">
               <a:rPr lang="en-US" smtClean="0"/>
-              <a:pPr defTabSz="964974"/>
+              <a:pPr defTabSz="964832"/>
               <a:t>23</a:t>
             </a:fld>
             <a:endParaRPr lang="en-US"/>
@@ -2552,7 +2552,7 @@
           <a:bodyPr/>
           <a:lstStyle/>
           <a:p>
-            <a:pPr defTabSz="964974"/>
+            <a:pPr defTabSz="964832"/>
             <a:r>
               <a:rPr lang="en-US"/>
               <a:t>Subprograms</a:t>
@@ -2577,10 +2577,10 @@
           <a:bodyPr/>
           <a:lstStyle/>
           <a:p>
-            <a:pPr defTabSz="964974"/>
+            <a:pPr defTabSz="964832"/>
             <a:fld id="{075CFEEC-27A7-4324-B2F7-29E65C8E0D3B}" type="slidenum">
               <a:rPr lang="en-US" smtClean="0"/>
-              <a:pPr defTabSz="964974"/>
+              <a:pPr defTabSz="964832"/>
               <a:t>27</a:t>
             </a:fld>
             <a:endParaRPr lang="en-US"/>
@@ -2670,7 +2670,7 @@
           <a:bodyPr/>
           <a:lstStyle/>
           <a:p>
-            <a:pPr defTabSz="964974"/>
+            <a:pPr defTabSz="964832"/>
             <a:r>
               <a:rPr lang="en-US"/>
               <a:t>Subprograms</a:t>
@@ -2695,10 +2695,10 @@
           <a:bodyPr/>
           <a:lstStyle/>
           <a:p>
-            <a:pPr defTabSz="964974"/>
+            <a:pPr defTabSz="964832"/>
             <a:fld id="{6AABD8DE-277E-4E2D-975F-03CE0BD20194}" type="slidenum">
               <a:rPr lang="en-US" smtClean="0"/>
-              <a:pPr defTabSz="964974"/>
+              <a:pPr defTabSz="964832"/>
               <a:t>35</a:t>
             </a:fld>
             <a:endParaRPr lang="en-US"/>
@@ -2788,7 +2788,7 @@
           <a:bodyPr/>
           <a:lstStyle/>
           <a:p>
-            <a:pPr defTabSz="964974"/>
+            <a:pPr defTabSz="964832"/>
             <a:r>
               <a:rPr lang="en-US"/>
               <a:t>Subprograms</a:t>
@@ -2813,10 +2813,10 @@
           <a:bodyPr/>
           <a:lstStyle/>
           <a:p>
-            <a:pPr defTabSz="964974"/>
+            <a:pPr defTabSz="964832"/>
             <a:fld id="{D8DD6345-1170-48A5-985B-EC96D61CA5D8}" type="slidenum">
               <a:rPr lang="en-US" smtClean="0"/>
-              <a:pPr defTabSz="964974"/>
+              <a:pPr defTabSz="964832"/>
               <a:t>36</a:t>
             </a:fld>
             <a:endParaRPr lang="en-US"/>
@@ -2906,7 +2906,7 @@
           <a:bodyPr/>
           <a:lstStyle/>
           <a:p>
-            <a:pPr defTabSz="964974"/>
+            <a:pPr defTabSz="964832"/>
             <a:r>
               <a:rPr lang="en-US"/>
               <a:t>Subprograms</a:t>
@@ -2931,10 +2931,10 @@
           <a:bodyPr/>
           <a:lstStyle/>
           <a:p>
-            <a:pPr defTabSz="964974"/>
+            <a:pPr defTabSz="964832"/>
             <a:fld id="{2FDE86E9-4526-4E85-8D5C-6C553B334C97}" type="slidenum">
               <a:rPr lang="en-US" smtClean="0"/>
-              <a:pPr defTabSz="964974"/>
+              <a:pPr defTabSz="964832"/>
               <a:t>39</a:t>
             </a:fld>
             <a:endParaRPr lang="en-US"/>
@@ -3258,7 +3258,7 @@
           <a:bodyPr/>
           <a:lstStyle/>
           <a:p>
-            <a:pPr defTabSz="964974"/>
+            <a:pPr defTabSz="964832"/>
             <a:r>
               <a:rPr lang="en-US"/>
               <a:t>Subprograms</a:t>
@@ -3283,10 +3283,10 @@
           <a:bodyPr/>
           <a:lstStyle/>
           <a:p>
-            <a:pPr defTabSz="964974"/>
+            <a:pPr defTabSz="964832"/>
             <a:fld id="{662CC49B-6813-45E9-B161-6D1C4C664607}" type="slidenum">
               <a:rPr lang="en-US" smtClean="0"/>
-              <a:pPr defTabSz="964974"/>
+              <a:pPr defTabSz="964832"/>
               <a:t>45</a:t>
             </a:fld>
             <a:endParaRPr lang="en-US"/>
@@ -3376,7 +3376,7 @@
           <a:bodyPr/>
           <a:lstStyle/>
           <a:p>
-            <a:pPr defTabSz="964974"/>
+            <a:pPr defTabSz="964832"/>
             <a:r>
               <a:rPr lang="en-US"/>
               <a:t>Subprograms</a:t>
@@ -3401,10 +3401,10 @@
           <a:bodyPr/>
           <a:lstStyle/>
           <a:p>
-            <a:pPr defTabSz="964974"/>
+            <a:pPr defTabSz="964832"/>
             <a:fld id="{93AFA024-7C4D-4338-9A21-2A5F7BE59F73}" type="slidenum">
               <a:rPr lang="en-US" smtClean="0"/>
-              <a:pPr defTabSz="964974"/>
+              <a:pPr defTabSz="964832"/>
               <a:t>47</a:t>
             </a:fld>
             <a:endParaRPr lang="en-US"/>
@@ -3494,7 +3494,7 @@
           <a:bodyPr/>
           <a:lstStyle/>
           <a:p>
-            <a:pPr defTabSz="964974"/>
+            <a:pPr defTabSz="964832"/>
             <a:r>
               <a:rPr lang="en-US"/>
               <a:t>Runtime Organization</a:t>
@@ -3519,10 +3519,10 @@
           <a:bodyPr/>
           <a:lstStyle/>
           <a:p>
-            <a:pPr defTabSz="964974"/>
+            <a:pPr defTabSz="964832"/>
             <a:fld id="{995EBB9F-4EA1-4F12-B672-467C2DE522FF}" type="slidenum">
               <a:rPr lang="en-US" smtClean="0"/>
-              <a:pPr defTabSz="964974"/>
+              <a:pPr defTabSz="964832"/>
               <a:t>3</a:t>
             </a:fld>
             <a:endParaRPr lang="en-US"/>
@@ -3612,7 +3612,7 @@
           <a:bodyPr/>
           <a:lstStyle/>
           <a:p>
-            <a:pPr defTabSz="964974"/>
+            <a:pPr defTabSz="964832"/>
             <a:r>
               <a:rPr lang="en-US"/>
               <a:t>Subprograms</a:t>
@@ -3637,10 +3637,10 @@
           <a:bodyPr/>
           <a:lstStyle/>
           <a:p>
-            <a:pPr defTabSz="964974"/>
+            <a:pPr defTabSz="964832"/>
             <a:fld id="{93AFA024-7C4D-4338-9A21-2A5F7BE59F73}" type="slidenum">
               <a:rPr lang="en-US" smtClean="0"/>
-              <a:pPr defTabSz="964974"/>
+              <a:pPr defTabSz="964832"/>
               <a:t>48</a:t>
             </a:fld>
             <a:endParaRPr lang="en-US"/>
@@ -3964,7 +3964,7 @@
           <a:bodyPr/>
           <a:lstStyle/>
           <a:p>
-            <a:pPr defTabSz="964974"/>
+            <a:pPr defTabSz="964832"/>
             <a:r>
               <a:rPr lang="en-US"/>
               <a:t>Subprograms</a:t>
@@ -3989,10 +3989,10 @@
           <a:bodyPr/>
           <a:lstStyle/>
           <a:p>
-            <a:pPr defTabSz="964974"/>
+            <a:pPr defTabSz="964832"/>
             <a:fld id="{6AABD8DE-277E-4E2D-975F-03CE0BD20194}" type="slidenum">
               <a:rPr lang="en-US" smtClean="0"/>
-              <a:pPr defTabSz="964974"/>
+              <a:pPr defTabSz="964832"/>
               <a:t>51</a:t>
             </a:fld>
             <a:endParaRPr lang="en-US"/>
@@ -4082,7 +4082,7 @@
           <a:bodyPr/>
           <a:lstStyle/>
           <a:p>
-            <a:pPr defTabSz="964974"/>
+            <a:pPr defTabSz="964832"/>
             <a:r>
               <a:rPr lang="en-US"/>
               <a:t>Subprograms</a:t>
@@ -4107,10 +4107,10 @@
           <a:bodyPr/>
           <a:lstStyle/>
           <a:p>
-            <a:pPr defTabSz="964974"/>
+            <a:pPr defTabSz="964832"/>
             <a:fld id="{D8DD6345-1170-48A5-985B-EC96D61CA5D8}" type="slidenum">
               <a:rPr lang="en-US" smtClean="0"/>
-              <a:pPr defTabSz="964974"/>
+              <a:pPr defTabSz="964832"/>
               <a:t>52</a:t>
             </a:fld>
             <a:endParaRPr lang="en-US"/>
@@ -4434,7 +4434,7 @@
           <a:bodyPr/>
           <a:lstStyle/>
           <a:p>
-            <a:pPr defTabSz="964974"/>
+            <a:pPr defTabSz="964832"/>
             <a:r>
               <a:rPr lang="en-US"/>
               <a:t>Subprograms</a:t>
@@ -4459,10 +4459,10 @@
           <a:bodyPr/>
           <a:lstStyle/>
           <a:p>
-            <a:pPr defTabSz="964974"/>
+            <a:pPr defTabSz="964832"/>
             <a:fld id="{6AABD8DE-277E-4E2D-975F-03CE0BD20194}" type="slidenum">
               <a:rPr lang="en-US" smtClean="0"/>
-              <a:pPr defTabSz="964974"/>
+              <a:pPr defTabSz="964832"/>
               <a:t>55</a:t>
             </a:fld>
             <a:endParaRPr lang="en-US"/>
@@ -4552,7 +4552,7 @@
           <a:bodyPr/>
           <a:lstStyle/>
           <a:p>
-            <a:pPr defTabSz="964974"/>
+            <a:pPr defTabSz="964832"/>
             <a:r>
               <a:rPr lang="en-US"/>
               <a:t>Subprograms</a:t>
@@ -4577,10 +4577,10 @@
           <a:bodyPr/>
           <a:lstStyle/>
           <a:p>
-            <a:pPr defTabSz="964974"/>
+            <a:pPr defTabSz="964832"/>
             <a:fld id="{D8DD6345-1170-48A5-985B-EC96D61CA5D8}" type="slidenum">
               <a:rPr lang="en-US" smtClean="0"/>
-              <a:pPr defTabSz="964974"/>
+              <a:pPr defTabSz="964832"/>
               <a:t>56</a:t>
             </a:fld>
             <a:endParaRPr lang="en-US"/>
@@ -4787,7 +4787,7 @@
           <a:bodyPr/>
           <a:lstStyle/>
           <a:p>
-            <a:pPr defTabSz="964974"/>
+            <a:pPr defTabSz="964832"/>
             <a:r>
               <a:rPr lang="en-US"/>
               <a:t>Runtime Organization</a:t>
@@ -4812,10 +4812,10 @@
           <a:bodyPr/>
           <a:lstStyle/>
           <a:p>
-            <a:pPr defTabSz="964974"/>
+            <a:pPr defTabSz="964832"/>
             <a:fld id="{3798D45F-38A7-4BD4-B7D0-C77FD73CC90D}" type="slidenum">
               <a:rPr lang="en-US" smtClean="0"/>
-              <a:pPr defTabSz="964974"/>
+              <a:pPr defTabSz="964832"/>
               <a:t>4</a:t>
             </a:fld>
             <a:endParaRPr lang="en-US"/>
@@ -5022,7 +5022,7 @@
           <a:bodyPr/>
           <a:lstStyle/>
           <a:p>
-            <a:pPr defTabSz="964974"/>
+            <a:pPr defTabSz="964832"/>
             <a:r>
               <a:rPr lang="en-US"/>
               <a:t>Subprograms</a:t>
@@ -5047,10 +5047,10 @@
           <a:bodyPr/>
           <a:lstStyle/>
           <a:p>
-            <a:pPr defTabSz="964974"/>
+            <a:pPr defTabSz="964832"/>
             <a:fld id="{1C8E9440-1093-468D-9FD6-32FEBA553126}" type="slidenum">
               <a:rPr lang="en-US" smtClean="0"/>
-              <a:pPr defTabSz="964974"/>
+              <a:pPr defTabSz="964832"/>
               <a:t>5</a:t>
             </a:fld>
             <a:endParaRPr lang="en-US"/>
@@ -5257,7 +5257,7 @@
           <a:bodyPr/>
           <a:lstStyle/>
           <a:p>
-            <a:pPr defTabSz="964974"/>
+            <a:pPr defTabSz="964832"/>
             <a:r>
               <a:rPr lang="en-US"/>
               <a:t>Subprograms</a:t>
@@ -5282,10 +5282,10 @@
           <a:bodyPr/>
           <a:lstStyle/>
           <a:p>
-            <a:pPr defTabSz="964974"/>
+            <a:pPr defTabSz="964832"/>
             <a:fld id="{6077FC34-8632-4858-AEC5-C715789CDB12}" type="slidenum">
               <a:rPr lang="en-US" smtClean="0"/>
-              <a:pPr defTabSz="964974"/>
+              <a:pPr defTabSz="964832"/>
               <a:t>7</a:t>
             </a:fld>
             <a:endParaRPr lang="en-US"/>
@@ -5375,7 +5375,7 @@
           <a:bodyPr/>
           <a:lstStyle/>
           <a:p>
-            <a:pPr defTabSz="964974"/>
+            <a:pPr defTabSz="964832"/>
             <a:r>
               <a:rPr lang="en-US"/>
               <a:t>Subprograms</a:t>
@@ -5400,10 +5400,10 @@
           <a:bodyPr/>
           <a:lstStyle/>
           <a:p>
-            <a:pPr defTabSz="964974"/>
+            <a:pPr defTabSz="964832"/>
             <a:fld id="{F2253710-3DDE-4A71-970A-B068258D7CFD}" type="slidenum">
               <a:rPr lang="en-US" smtClean="0"/>
-              <a:pPr defTabSz="964974"/>
+              <a:pPr defTabSz="964832"/>
               <a:t>8</a:t>
             </a:fld>
             <a:endParaRPr lang="en-US"/>
@@ -5493,7 +5493,7 @@
           <a:bodyPr/>
           <a:lstStyle/>
           <a:p>
-            <a:pPr defTabSz="964974"/>
+            <a:pPr defTabSz="964832"/>
             <a:r>
               <a:rPr lang="en-US"/>
               <a:t>Subprograms</a:t>
@@ -5518,10 +5518,10 @@
           <a:bodyPr/>
           <a:lstStyle/>
           <a:p>
-            <a:pPr defTabSz="964974"/>
+            <a:pPr defTabSz="964832"/>
             <a:fld id="{EB7972A9-078D-4C96-9A05-F5C8A4AEC107}" type="slidenum">
               <a:rPr lang="en-US" smtClean="0"/>
-              <a:pPr defTabSz="964974"/>
+              <a:pPr defTabSz="964832"/>
               <a:t>11</a:t>
             </a:fld>
             <a:endParaRPr lang="en-US"/>
@@ -25141,7 +25141,7 @@
             </a:r>
             <a:r>
               <a:rPr lang="en-US" dirty="0"/>
-              <a:t> to allocate space on the stack;  e.g., for a function return value or a subprogram’s local variable.</a:t>
+              <a:t> to allocate space on the stack; e.g., for a function return value or a subprogram’s local variable.</a:t>
             </a:r>
           </a:p>
           <a:p>
@@ -25674,7 +25674,7 @@
             </a:r>
             <a:r>
               <a:rPr lang="en-US" sz="2300" dirty="0"/>
-              <a:t> for program variables except that the relative address of the first local variable is 8 instead of 0 since there are 8 bytes in activation record.</a:t>
+              <a:t> for program variables except that the relative address of the first local variable is 8 instead of 0 since there are 8 bytes in the context part of the activation record.</a:t>
             </a:r>
           </a:p>
           <a:p>

</xml_diff>